<commit_message>
added maven and git presentations
</commit_message>
<xml_diff>
--- a/multithreading/presentation.pptx
+++ b/multithreading/presentation.pptx
@@ -17,6 +17,14 @@
     <p:sldId id="263" r:id="rId11"/>
     <p:sldId id="266" r:id="rId12"/>
     <p:sldId id="267" r:id="rId13"/>
+    <p:sldId id="268" r:id="rId14"/>
+    <p:sldId id="269" r:id="rId15"/>
+    <p:sldId id="270" r:id="rId16"/>
+    <p:sldId id="271" r:id="rId17"/>
+    <p:sldId id="272" r:id="rId18"/>
+    <p:sldId id="273" r:id="rId19"/>
+    <p:sldId id="275" r:id="rId20"/>
+    <p:sldId id="274" r:id="rId21"/>
   </p:sldIdLst>
   <p:sldSz cx="12192000" cy="6858000"/>
   <p:notesSz cx="6858000" cy="9144000"/>
@@ -397,7 +405,7 @@
           <a:p>
             <a:fld id="{78ABE3C1-DBE1-495D-B57B-2849774B866A}" type="datetimeFigureOut">
               <a:rPr lang="en-US" smtClean="0"/>
-              <a:t>5/30/23</a:t>
+              <a:t>6/6/23</a:t>
             </a:fld>
             <a:endParaRPr lang="en-US" dirty="0"/>
           </a:p>
@@ -811,7 +819,7 @@
           <a:p>
             <a:fld id="{9D6E9DEC-419B-4CC5-A080-3B06BD5A8291}" type="datetimeFigureOut">
               <a:rPr lang="en-US" smtClean="0"/>
-              <a:t>5/30/23</a:t>
+              <a:t>6/6/23</a:t>
             </a:fld>
             <a:endParaRPr lang="en-US" dirty="0"/>
           </a:p>
@@ -1149,7 +1157,7 @@
           <a:p>
             <a:fld id="{9D6E9DEC-419B-4CC5-A080-3B06BD5A8291}" type="datetimeFigureOut">
               <a:rPr lang="en-US" smtClean="0"/>
-              <a:t>5/30/23</a:t>
+              <a:t>6/6/23</a:t>
             </a:fld>
             <a:endParaRPr lang="en-US" dirty="0"/>
           </a:p>
@@ -1556,7 +1564,7 @@
           <a:p>
             <a:fld id="{9D6E9DEC-419B-4CC5-A080-3B06BD5A8291}" type="datetimeFigureOut">
               <a:rPr lang="en-US" smtClean="0"/>
-              <a:t>5/30/23</a:t>
+              <a:t>6/6/23</a:t>
             </a:fld>
             <a:endParaRPr lang="en-US" dirty="0"/>
           </a:p>
@@ -2126,7 +2134,7 @@
           <a:p>
             <a:fld id="{9D6E9DEC-419B-4CC5-A080-3B06BD5A8291}" type="datetimeFigureOut">
               <a:rPr lang="en-US" smtClean="0"/>
-              <a:t>5/30/23</a:t>
+              <a:t>6/6/23</a:t>
             </a:fld>
             <a:endParaRPr lang="en-US" dirty="0"/>
           </a:p>
@@ -2809,7 +2817,7 @@
           <a:p>
             <a:fld id="{9D6E9DEC-419B-4CC5-A080-3B06BD5A8291}" type="datetimeFigureOut">
               <a:rPr lang="en-US" smtClean="0"/>
-              <a:t>5/30/23</a:t>
+              <a:t>6/6/23</a:t>
             </a:fld>
             <a:endParaRPr lang="en-US" dirty="0"/>
           </a:p>
@@ -3724,7 +3732,7 @@
           <a:p>
             <a:fld id="{9D6E9DEC-419B-4CC5-A080-3B06BD5A8291}" type="datetimeFigureOut">
               <a:rPr lang="en-US" smtClean="0"/>
-              <a:t>5/30/23</a:t>
+              <a:t>6/6/23</a:t>
             </a:fld>
             <a:endParaRPr lang="en-US" dirty="0"/>
           </a:p>
@@ -4039,7 +4047,7 @@
           <a:p>
             <a:fld id="{1FA3F48C-C7C6-4055-9F49-3777875E72AE}" type="datetimeFigureOut">
               <a:rPr lang="en-US" smtClean="0"/>
-              <a:t>5/30/23</a:t>
+              <a:t>6/6/23</a:t>
             </a:fld>
             <a:endParaRPr lang="en-US" dirty="0"/>
           </a:p>
@@ -4303,7 +4311,7 @@
           <a:p>
             <a:fld id="{6178E61D-D431-422C-9764-11DAFE33AB63}" type="datetimeFigureOut">
               <a:rPr lang="en-US" smtClean="0"/>
-              <a:t>5/30/23</a:t>
+              <a:t>6/6/23</a:t>
             </a:fld>
             <a:endParaRPr lang="en-US" dirty="0"/>
           </a:p>
@@ -4627,7 +4635,7 @@
           <a:p>
             <a:fld id="{12DE42F4-6EEF-4EF7-8ED4-2208F0F89A08}" type="datetimeFigureOut">
               <a:rPr lang="en-US" smtClean="0"/>
-              <a:t>5/30/23</a:t>
+              <a:t>6/6/23</a:t>
             </a:fld>
             <a:endParaRPr lang="en-US" dirty="0"/>
           </a:p>
@@ -5016,7 +5024,7 @@
           <a:p>
             <a:fld id="{30578ACC-22D6-47C1-A373-4FD133E34F3C}" type="datetimeFigureOut">
               <a:rPr lang="en-US" smtClean="0"/>
-              <a:t>5/30/23</a:t>
+              <a:t>6/6/23</a:t>
             </a:fld>
             <a:endParaRPr lang="en-US" dirty="0"/>
           </a:p>
@@ -5392,7 +5400,7 @@
           <a:p>
             <a:fld id="{4E5A6C69-6797-4E8A-BF37-F2C3751466E9}" type="datetimeFigureOut">
               <a:rPr lang="en-US" smtClean="0"/>
-              <a:t>5/30/23</a:t>
+              <a:t>6/6/23</a:t>
             </a:fld>
             <a:endParaRPr lang="en-US" dirty="0"/>
           </a:p>
@@ -5898,7 +5906,7 @@
           <a:p>
             <a:fld id="{D82014A1-A632-4878-A0D3-F52BA7563730}" type="datetimeFigureOut">
               <a:rPr lang="en-US" smtClean="0"/>
-              <a:t>5/30/23</a:t>
+              <a:t>6/6/23</a:t>
             </a:fld>
             <a:endParaRPr lang="en-US" dirty="0"/>
           </a:p>
@@ -6155,7 +6163,7 @@
           <a:p>
             <a:fld id="{CE99F462-093F-4566-844B-4C71F2739DA5}" type="datetimeFigureOut">
               <a:rPr lang="en-US" smtClean="0"/>
-              <a:t>5/30/23</a:t>
+              <a:t>6/6/23</a:t>
             </a:fld>
             <a:endParaRPr lang="en-US" dirty="0"/>
           </a:p>
@@ -6318,7 +6326,7 @@
           <a:p>
             <a:fld id="{3D24A7AC-904D-4781-85BA-7D10C17ED021}" type="datetimeFigureOut">
               <a:rPr lang="en-US" smtClean="0"/>
-              <a:t>5/30/23</a:t>
+              <a:t>6/6/23</a:t>
             </a:fld>
             <a:endParaRPr lang="en-US" dirty="0"/>
           </a:p>
@@ -6708,7 +6716,7 @@
           <a:p>
             <a:fld id="{E331444B-B92B-4E27-8C94-BB93EAF5CB18}" type="datetimeFigureOut">
               <a:rPr lang="en-US" smtClean="0"/>
-              <a:t>5/30/23</a:t>
+              <a:t>6/6/23</a:t>
             </a:fld>
             <a:endParaRPr lang="en-US" dirty="0"/>
           </a:p>
@@ -7117,7 +7125,7 @@
           <a:p>
             <a:fld id="{363EFA5E-FA76-400D-B3DC-F0BA90E6D107}" type="datetimeFigureOut">
               <a:rPr lang="en-US" smtClean="0"/>
-              <a:t>5/30/23</a:t>
+              <a:t>6/6/23</a:t>
             </a:fld>
             <a:endParaRPr lang="en-US" dirty="0"/>
           </a:p>
@@ -7361,7 +7369,7 @@
           <a:p>
             <a:fld id="{9D6E9DEC-419B-4CC5-A080-3B06BD5A8291}" type="datetimeFigureOut">
               <a:rPr lang="en-US" smtClean="0"/>
-              <a:t>5/30/23</a:t>
+              <a:t>6/6/23</a:t>
             </a:fld>
             <a:endParaRPr lang="en-US" dirty="0"/>
           </a:p>
@@ -8401,6 +8409,843 @@
 </p:sld>
 </file>
 
+<file path=ppt/slides/slide13.xml><?xml version="1.0" encoding="utf-8"?>
+<p:sld xmlns:a="http://schemas.openxmlformats.org/drawingml/2006/main" xmlns:r="http://schemas.openxmlformats.org/officeDocument/2006/relationships" xmlns:p="http://schemas.openxmlformats.org/presentationml/2006/main">
+  <p:cSld>
+    <p:spTree>
+      <p:nvGrpSpPr>
+        <p:cNvPr id="1" name=""/>
+        <p:cNvGrpSpPr/>
+        <p:nvPr/>
+      </p:nvGrpSpPr>
+      <p:grpSpPr>
+        <a:xfrm>
+          <a:off x="0" y="0"/>
+          <a:ext cx="0" cy="0"/>
+          <a:chOff x="0" y="0"/>
+          <a:chExt cx="0" cy="0"/>
+        </a:xfrm>
+      </p:grpSpPr>
+      <p:sp>
+        <p:nvSpPr>
+          <p:cNvPr id="2" name="Title 1">
+            <a:extLst>
+              <a:ext uri="{FF2B5EF4-FFF2-40B4-BE49-F238E27FC236}">
+                <a16:creationId xmlns:a16="http://schemas.microsoft.com/office/drawing/2014/main" id="{31EC4D90-DB6D-12D4-E6A0-1ED842D97D9D}"/>
+              </a:ext>
+            </a:extLst>
+          </p:cNvPr>
+          <p:cNvSpPr>
+            <a:spLocks noGrp="1"/>
+          </p:cNvSpPr>
+          <p:nvPr>
+            <p:ph type="title"/>
+          </p:nvPr>
+        </p:nvSpPr>
+        <p:spPr/>
+        <p:txBody>
+          <a:bodyPr/>
+          <a:lstStyle/>
+          <a:p>
+            <a:r>
+              <a:rPr lang="en-RU" b="1" dirty="0"/>
+              <a:t>Semaphore</a:t>
+            </a:r>
+          </a:p>
+        </p:txBody>
+      </p:sp>
+      <p:sp>
+        <p:nvSpPr>
+          <p:cNvPr id="3" name="Content Placeholder 2">
+            <a:extLst>
+              <a:ext uri="{FF2B5EF4-FFF2-40B4-BE49-F238E27FC236}">
+                <a16:creationId xmlns:a16="http://schemas.microsoft.com/office/drawing/2014/main" id="{CD21A06A-B3DD-0D71-0448-E64F04D5EE38}"/>
+              </a:ext>
+            </a:extLst>
+          </p:cNvPr>
+          <p:cNvSpPr>
+            <a:spLocks noGrp="1"/>
+          </p:cNvSpPr>
+          <p:nvPr>
+            <p:ph idx="1"/>
+          </p:nvPr>
+        </p:nvSpPr>
+        <p:spPr/>
+        <p:txBody>
+          <a:bodyPr/>
+          <a:lstStyle/>
+          <a:p>
+            <a:r>
+              <a:rPr lang="ru-RU" dirty="0"/>
+              <a:t>Семафоры представляют еще одно средство синхронизации для доступа к ресурсу. В </a:t>
+            </a:r>
+            <a:r>
+              <a:rPr lang="en" i="1" dirty="0"/>
+              <a:t>Java</a:t>
+            </a:r>
+            <a:r>
+              <a:rPr lang="en" dirty="0"/>
+              <a:t> </a:t>
+            </a:r>
+            <a:r>
+              <a:rPr lang="ru-RU" dirty="0"/>
+              <a:t>семафоры представлены классом </a:t>
+            </a:r>
+            <a:r>
+              <a:rPr lang="en" i="1" dirty="0"/>
+              <a:t>Semaphore</a:t>
+            </a:r>
+            <a:r>
+              <a:rPr lang="en" dirty="0"/>
+              <a:t>, </a:t>
+            </a:r>
+            <a:r>
+              <a:rPr lang="ru-RU" dirty="0"/>
+              <a:t>который располагается в пакете </a:t>
+            </a:r>
+            <a:r>
+              <a:rPr lang="en" i="1" dirty="0" err="1"/>
+              <a:t>java.util.concurrent</a:t>
+            </a:r>
+            <a:r>
+              <a:rPr lang="en" dirty="0"/>
+              <a:t>.</a:t>
+            </a:r>
+            <a:endParaRPr kumimoji="0" lang="ru-RU" altLang="ru-RU" sz="2800" b="0" i="0" u="none" strike="noStrike" cap="none" normalizeH="0" baseline="0" dirty="0">
+              <a:ln>
+                <a:noFill/>
+              </a:ln>
+              <a:solidFill>
+                <a:schemeClr val="tx1"/>
+              </a:solidFill>
+              <a:effectLst/>
+              <a:latin typeface="Arial" pitchFamily="34" charset="0"/>
+              <a:cs typeface="Arial" pitchFamily="34" charset="0"/>
+            </a:endParaRPr>
+          </a:p>
+          <a:p>
+            <a:r>
+              <a:rPr lang="ru-RU" dirty="0"/>
+              <a:t>Для получения разрешения у семафора надо вызвать метод </a:t>
+            </a:r>
+            <a:r>
+              <a:rPr lang="en" i="1" dirty="0"/>
+              <a:t>acquire().</a:t>
+            </a:r>
+            <a:endParaRPr lang="ru-RU" i="1" dirty="0"/>
+          </a:p>
+          <a:p>
+            <a:r>
+              <a:rPr lang="ru-RU" dirty="0"/>
+              <a:t>После окончания работы с ресурсом полученное ранее разрешение надо освободить с помощью метода </a:t>
+            </a:r>
+            <a:r>
+              <a:rPr lang="en" i="1" dirty="0"/>
+              <a:t>release()</a:t>
+            </a:r>
+            <a:r>
+              <a:rPr lang="ru-RU" i="1" dirty="0"/>
+              <a:t>.</a:t>
+            </a:r>
+          </a:p>
+          <a:p>
+            <a:endParaRPr lang="en-RU" dirty="0"/>
+          </a:p>
+        </p:txBody>
+      </p:sp>
+    </p:spTree>
+    <p:extLst>
+      <p:ext uri="{BB962C8B-B14F-4D97-AF65-F5344CB8AC3E}">
+        <p14:creationId xmlns:p14="http://schemas.microsoft.com/office/powerpoint/2010/main" val="1777602253"/>
+      </p:ext>
+    </p:extLst>
+  </p:cSld>
+  <p:clrMapOvr>
+    <a:masterClrMapping/>
+  </p:clrMapOvr>
+</p:sld>
+</file>
+
+<file path=ppt/slides/slide14.xml><?xml version="1.0" encoding="utf-8"?>
+<p:sld xmlns:a="http://schemas.openxmlformats.org/drawingml/2006/main" xmlns:r="http://schemas.openxmlformats.org/officeDocument/2006/relationships" xmlns:p="http://schemas.openxmlformats.org/presentationml/2006/main">
+  <p:cSld>
+    <p:spTree>
+      <p:nvGrpSpPr>
+        <p:cNvPr id="1" name=""/>
+        <p:cNvGrpSpPr/>
+        <p:nvPr/>
+      </p:nvGrpSpPr>
+      <p:grpSpPr>
+        <a:xfrm>
+          <a:off x="0" y="0"/>
+          <a:ext cx="0" cy="0"/>
+          <a:chOff x="0" y="0"/>
+          <a:chExt cx="0" cy="0"/>
+        </a:xfrm>
+      </p:grpSpPr>
+      <p:sp>
+        <p:nvSpPr>
+          <p:cNvPr id="2" name="Title 1">
+            <a:extLst>
+              <a:ext uri="{FF2B5EF4-FFF2-40B4-BE49-F238E27FC236}">
+                <a16:creationId xmlns:a16="http://schemas.microsoft.com/office/drawing/2014/main" id="{E844FF78-B2C8-671E-4942-40F9E6B10819}"/>
+              </a:ext>
+            </a:extLst>
+          </p:cNvPr>
+          <p:cNvSpPr>
+            <a:spLocks noGrp="1"/>
+          </p:cNvSpPr>
+          <p:nvPr>
+            <p:ph type="title"/>
+          </p:nvPr>
+        </p:nvSpPr>
+        <p:spPr/>
+        <p:txBody>
+          <a:bodyPr/>
+          <a:lstStyle/>
+          <a:p>
+            <a:r>
+              <a:rPr lang="en-US" b="1" dirty="0"/>
+              <a:t>Semaphore</a:t>
+            </a:r>
+            <a:endParaRPr lang="en-RU" b="1" dirty="0"/>
+          </a:p>
+        </p:txBody>
+      </p:sp>
+      <p:pic>
+        <p:nvPicPr>
+          <p:cNvPr id="4" name="Рисунок 12">
+            <a:extLst>
+              <a:ext uri="{FF2B5EF4-FFF2-40B4-BE49-F238E27FC236}">
+                <a16:creationId xmlns:a16="http://schemas.microsoft.com/office/drawing/2014/main" id="{E36132A7-D112-4EFE-4308-2B231120E7A3}"/>
+              </a:ext>
+            </a:extLst>
+          </p:cNvPr>
+          <p:cNvPicPr>
+            <a:picLocks noGrp="1" noChangeAspect="1"/>
+          </p:cNvPicPr>
+          <p:nvPr>
+            <p:ph idx="1"/>
+          </p:nvPr>
+        </p:nvPicPr>
+        <p:blipFill>
+          <a:blip r:embed="rId2"/>
+          <a:stretch>
+            <a:fillRect/>
+          </a:stretch>
+        </p:blipFill>
+        <p:spPr>
+          <a:xfrm>
+            <a:off x="2490788" y="2339181"/>
+            <a:ext cx="5994400" cy="3594100"/>
+          </a:xfrm>
+          <a:prstGeom prst="rect">
+            <a:avLst/>
+          </a:prstGeom>
+        </p:spPr>
+      </p:pic>
+    </p:spTree>
+    <p:extLst>
+      <p:ext uri="{BB962C8B-B14F-4D97-AF65-F5344CB8AC3E}">
+        <p14:creationId xmlns:p14="http://schemas.microsoft.com/office/powerpoint/2010/main" val="772457215"/>
+      </p:ext>
+    </p:extLst>
+  </p:cSld>
+  <p:clrMapOvr>
+    <a:masterClrMapping/>
+  </p:clrMapOvr>
+</p:sld>
+</file>
+
+<file path=ppt/slides/slide15.xml><?xml version="1.0" encoding="utf-8"?>
+<p:sld xmlns:a="http://schemas.openxmlformats.org/drawingml/2006/main" xmlns:r="http://schemas.openxmlformats.org/officeDocument/2006/relationships" xmlns:p="http://schemas.openxmlformats.org/presentationml/2006/main">
+  <p:cSld>
+    <p:spTree>
+      <p:nvGrpSpPr>
+        <p:cNvPr id="1" name=""/>
+        <p:cNvGrpSpPr/>
+        <p:nvPr/>
+      </p:nvGrpSpPr>
+      <p:grpSpPr>
+        <a:xfrm>
+          <a:off x="0" y="0"/>
+          <a:ext cx="0" cy="0"/>
+          <a:chOff x="0" y="0"/>
+          <a:chExt cx="0" cy="0"/>
+        </a:xfrm>
+      </p:grpSpPr>
+      <p:sp>
+        <p:nvSpPr>
+          <p:cNvPr id="2" name="Title 1">
+            <a:extLst>
+              <a:ext uri="{FF2B5EF4-FFF2-40B4-BE49-F238E27FC236}">
+                <a16:creationId xmlns:a16="http://schemas.microsoft.com/office/drawing/2014/main" id="{15F1E21C-96BE-B749-FBCF-A6E3F89FC75F}"/>
+              </a:ext>
+            </a:extLst>
+          </p:cNvPr>
+          <p:cNvSpPr>
+            <a:spLocks noGrp="1"/>
+          </p:cNvSpPr>
+          <p:nvPr>
+            <p:ph type="title"/>
+          </p:nvPr>
+        </p:nvSpPr>
+        <p:spPr/>
+        <p:txBody>
+          <a:bodyPr/>
+          <a:lstStyle/>
+          <a:p>
+            <a:r>
+              <a:rPr lang="en-RU" b="1" dirty="0"/>
+              <a:t>CountDownLatch</a:t>
+            </a:r>
+          </a:p>
+        </p:txBody>
+      </p:sp>
+      <p:sp>
+        <p:nvSpPr>
+          <p:cNvPr id="3" name="Content Placeholder 2">
+            <a:extLst>
+              <a:ext uri="{FF2B5EF4-FFF2-40B4-BE49-F238E27FC236}">
+                <a16:creationId xmlns:a16="http://schemas.microsoft.com/office/drawing/2014/main" id="{434E62F5-E7B9-F18D-7BE6-45D64A0D8D6B}"/>
+              </a:ext>
+            </a:extLst>
+          </p:cNvPr>
+          <p:cNvSpPr>
+            <a:spLocks noGrp="1"/>
+          </p:cNvSpPr>
+          <p:nvPr>
+            <p:ph idx="1"/>
+          </p:nvPr>
+        </p:nvSpPr>
+        <p:spPr/>
+        <p:txBody>
+          <a:bodyPr/>
+          <a:lstStyle/>
+          <a:p>
+            <a:r>
+              <a:rPr lang="en" i="1" dirty="0" err="1"/>
+              <a:t>CountDownLatch</a:t>
+            </a:r>
+            <a:r>
+              <a:rPr lang="en" dirty="0"/>
+              <a:t> </a:t>
+            </a:r>
+            <a:r>
+              <a:rPr lang="ru-RU" dirty="0"/>
+              <a:t>предоставляет возможность любому количеству потоков в блоке кода ожидать до тех пор, пока не завершится определенное количество операций, выполняющихся в других потоках, перед тем как они продолжат свою деятельность.</a:t>
+            </a:r>
+            <a:endParaRPr kumimoji="0" lang="ru-RU" altLang="ru-RU" sz="2800" b="0" i="0" u="none" strike="noStrike" cap="none" normalizeH="0" baseline="0" dirty="0">
+              <a:ln>
+                <a:noFill/>
+              </a:ln>
+              <a:solidFill>
+                <a:schemeClr val="tx1"/>
+              </a:solidFill>
+              <a:effectLst/>
+              <a:latin typeface="Arial" pitchFamily="34" charset="0"/>
+              <a:cs typeface="Arial" pitchFamily="34" charset="0"/>
+            </a:endParaRPr>
+          </a:p>
+          <a:p>
+            <a:r>
+              <a:rPr lang="ru-RU" dirty="0"/>
+              <a:t>Управление счетчиком производится через метод </a:t>
+            </a:r>
+            <a:r>
+              <a:rPr lang="en-US" i="1" dirty="0" err="1"/>
+              <a:t>countDown</a:t>
+            </a:r>
+            <a:r>
+              <a:rPr lang="en-US" i="1" dirty="0"/>
+              <a:t>().</a:t>
+            </a:r>
+          </a:p>
+          <a:p>
+            <a:r>
+              <a:rPr lang="en-US" i="1" dirty="0"/>
+              <a:t>await() </a:t>
+            </a:r>
+            <a:r>
+              <a:rPr lang="ru-RU" dirty="0"/>
+              <a:t>– блокирует поток пока счетчик не будет равен 0</a:t>
+            </a:r>
+            <a:r>
+              <a:rPr lang="en-US" dirty="0"/>
+              <a:t>.</a:t>
+            </a:r>
+            <a:endParaRPr lang="ru-RU" b="1" dirty="0"/>
+          </a:p>
+          <a:p>
+            <a:r>
+              <a:rPr lang="ru-RU" dirty="0"/>
+              <a:t>Когда счётчик достигает 0, все ожидающие потоки </a:t>
+            </a:r>
+            <a:r>
+              <a:rPr lang="ru-RU" dirty="0" err="1"/>
+              <a:t>разблокируются</a:t>
+            </a:r>
+            <a:r>
+              <a:rPr lang="ru-RU" dirty="0"/>
+              <a:t> и продолжают выполняться</a:t>
+            </a:r>
+            <a:r>
+              <a:rPr lang="en-US" dirty="0"/>
+              <a:t>.</a:t>
+            </a:r>
+            <a:endParaRPr lang="ru-RU" dirty="0"/>
+          </a:p>
+          <a:p>
+            <a:endParaRPr lang="en-RU" dirty="0"/>
+          </a:p>
+        </p:txBody>
+      </p:sp>
+    </p:spTree>
+    <p:extLst>
+      <p:ext uri="{BB962C8B-B14F-4D97-AF65-F5344CB8AC3E}">
+        <p14:creationId xmlns:p14="http://schemas.microsoft.com/office/powerpoint/2010/main" val="2065301274"/>
+      </p:ext>
+    </p:extLst>
+  </p:cSld>
+  <p:clrMapOvr>
+    <a:masterClrMapping/>
+  </p:clrMapOvr>
+</p:sld>
+</file>
+
+<file path=ppt/slides/slide16.xml><?xml version="1.0" encoding="utf-8"?>
+<p:sld xmlns:a="http://schemas.openxmlformats.org/drawingml/2006/main" xmlns:r="http://schemas.openxmlformats.org/officeDocument/2006/relationships" xmlns:p="http://schemas.openxmlformats.org/presentationml/2006/main">
+  <p:cSld>
+    <p:spTree>
+      <p:nvGrpSpPr>
+        <p:cNvPr id="1" name=""/>
+        <p:cNvGrpSpPr/>
+        <p:nvPr/>
+      </p:nvGrpSpPr>
+      <p:grpSpPr>
+        <a:xfrm>
+          <a:off x="0" y="0"/>
+          <a:ext cx="0" cy="0"/>
+          <a:chOff x="0" y="0"/>
+          <a:chExt cx="0" cy="0"/>
+        </a:xfrm>
+      </p:grpSpPr>
+      <p:sp>
+        <p:nvSpPr>
+          <p:cNvPr id="2" name="Title 1">
+            <a:extLst>
+              <a:ext uri="{FF2B5EF4-FFF2-40B4-BE49-F238E27FC236}">
+                <a16:creationId xmlns:a16="http://schemas.microsoft.com/office/drawing/2014/main" id="{63580A1D-B748-65E0-9FFF-B34F543A40CA}"/>
+              </a:ext>
+            </a:extLst>
+          </p:cNvPr>
+          <p:cNvSpPr>
+            <a:spLocks noGrp="1"/>
+          </p:cNvSpPr>
+          <p:nvPr>
+            <p:ph type="title"/>
+          </p:nvPr>
+        </p:nvSpPr>
+        <p:spPr/>
+        <p:txBody>
+          <a:bodyPr/>
+          <a:lstStyle/>
+          <a:p>
+            <a:r>
+              <a:rPr lang="en-RU" b="1" dirty="0"/>
+              <a:t>CountDownLatch</a:t>
+            </a:r>
+            <a:endParaRPr lang="en-RU" dirty="0"/>
+          </a:p>
+        </p:txBody>
+      </p:sp>
+      <p:pic>
+        <p:nvPicPr>
+          <p:cNvPr id="4" name="Рисунок 3">
+            <a:extLst>
+              <a:ext uri="{FF2B5EF4-FFF2-40B4-BE49-F238E27FC236}">
+                <a16:creationId xmlns:a16="http://schemas.microsoft.com/office/drawing/2014/main" id="{959171E4-98F4-E3B9-EA0E-57FF2A3A8A4B}"/>
+              </a:ext>
+            </a:extLst>
+          </p:cNvPr>
+          <p:cNvPicPr>
+            <a:picLocks noGrp="1" noChangeAspect="1"/>
+          </p:cNvPicPr>
+          <p:nvPr>
+            <p:ph idx="1"/>
+          </p:nvPr>
+        </p:nvPicPr>
+        <p:blipFill>
+          <a:blip r:embed="rId2"/>
+          <a:stretch>
+            <a:fillRect/>
+          </a:stretch>
+        </p:blipFill>
+        <p:spPr>
+          <a:xfrm>
+            <a:off x="2490788" y="2339181"/>
+            <a:ext cx="5994400" cy="3594100"/>
+          </a:xfrm>
+          <a:prstGeom prst="rect">
+            <a:avLst/>
+          </a:prstGeom>
+        </p:spPr>
+      </p:pic>
+    </p:spTree>
+    <p:extLst>
+      <p:ext uri="{BB962C8B-B14F-4D97-AF65-F5344CB8AC3E}">
+        <p14:creationId xmlns:p14="http://schemas.microsoft.com/office/powerpoint/2010/main" val="4097596361"/>
+      </p:ext>
+    </p:extLst>
+  </p:cSld>
+  <p:clrMapOvr>
+    <a:masterClrMapping/>
+  </p:clrMapOvr>
+</p:sld>
+</file>
+
+<file path=ppt/slides/slide17.xml><?xml version="1.0" encoding="utf-8"?>
+<p:sld xmlns:a="http://schemas.openxmlformats.org/drawingml/2006/main" xmlns:r="http://schemas.openxmlformats.org/officeDocument/2006/relationships" xmlns:p="http://schemas.openxmlformats.org/presentationml/2006/main">
+  <p:cSld>
+    <p:spTree>
+      <p:nvGrpSpPr>
+        <p:cNvPr id="1" name=""/>
+        <p:cNvGrpSpPr/>
+        <p:nvPr/>
+      </p:nvGrpSpPr>
+      <p:grpSpPr>
+        <a:xfrm>
+          <a:off x="0" y="0"/>
+          <a:ext cx="0" cy="0"/>
+          <a:chOff x="0" y="0"/>
+          <a:chExt cx="0" cy="0"/>
+        </a:xfrm>
+      </p:grpSpPr>
+      <p:sp>
+        <p:nvSpPr>
+          <p:cNvPr id="2" name="Title 1">
+            <a:extLst>
+              <a:ext uri="{FF2B5EF4-FFF2-40B4-BE49-F238E27FC236}">
+                <a16:creationId xmlns:a16="http://schemas.microsoft.com/office/drawing/2014/main" id="{6039D352-EFB2-7D0C-0CB5-C2045475BCFF}"/>
+              </a:ext>
+            </a:extLst>
+          </p:cNvPr>
+          <p:cNvSpPr>
+            <a:spLocks noGrp="1"/>
+          </p:cNvSpPr>
+          <p:nvPr>
+            <p:ph type="title"/>
+          </p:nvPr>
+        </p:nvSpPr>
+        <p:spPr/>
+        <p:txBody>
+          <a:bodyPr/>
+          <a:lstStyle/>
+          <a:p>
+            <a:r>
+              <a:rPr lang="en-RU" b="1" dirty="0"/>
+              <a:t>Exchanger</a:t>
+            </a:r>
+          </a:p>
+        </p:txBody>
+      </p:sp>
+      <p:sp>
+        <p:nvSpPr>
+          <p:cNvPr id="3" name="Content Placeholder 2">
+            <a:extLst>
+              <a:ext uri="{FF2B5EF4-FFF2-40B4-BE49-F238E27FC236}">
+                <a16:creationId xmlns:a16="http://schemas.microsoft.com/office/drawing/2014/main" id="{0F10C29D-4165-6CE6-7169-3B13BCCEC20E}"/>
+              </a:ext>
+            </a:extLst>
+          </p:cNvPr>
+          <p:cNvSpPr>
+            <a:spLocks noGrp="1"/>
+          </p:cNvSpPr>
+          <p:nvPr>
+            <p:ph idx="1"/>
+          </p:nvPr>
+        </p:nvSpPr>
+        <p:spPr/>
+        <p:txBody>
+          <a:bodyPr/>
+          <a:lstStyle/>
+          <a:p>
+            <a:r>
+              <a:rPr lang="en" i="1" dirty="0"/>
+              <a:t>Exchanger</a:t>
+            </a:r>
+            <a:r>
+              <a:rPr lang="en" dirty="0"/>
+              <a:t> </a:t>
+            </a:r>
+            <a:r>
+              <a:rPr lang="ru-RU" dirty="0"/>
+              <a:t>может понадобиться, для того, чтобы обменяться данными между двумя потоками в определенной точки работы обоих потоков.</a:t>
+            </a:r>
+            <a:endParaRPr kumimoji="0" lang="ru-RU" altLang="ru-RU" sz="2800" b="0" i="0" u="none" strike="noStrike" cap="none" normalizeH="0" baseline="0" dirty="0">
+              <a:ln>
+                <a:noFill/>
+              </a:ln>
+              <a:solidFill>
+                <a:schemeClr val="tx1"/>
+              </a:solidFill>
+              <a:effectLst/>
+              <a:latin typeface="Arial" pitchFamily="34" charset="0"/>
+              <a:cs typeface="Arial" pitchFamily="34" charset="0"/>
+            </a:endParaRPr>
+          </a:p>
+          <a:p>
+            <a:r>
+              <a:rPr lang="ru-RU" dirty="0"/>
+              <a:t>Для обмена данными между двумя потоками используется метод </a:t>
+            </a:r>
+            <a:r>
+              <a:rPr lang="en-US" i="1" dirty="0"/>
+              <a:t>exchange()</a:t>
+            </a:r>
+            <a:r>
+              <a:rPr lang="ru-RU" i="1" dirty="0"/>
+              <a:t>.</a:t>
+            </a:r>
+            <a:r>
+              <a:rPr lang="ru-RU" dirty="0"/>
+              <a:t> Он блокирует поток до вызова того же метода в другом потоке.</a:t>
+            </a:r>
+          </a:p>
+          <a:p>
+            <a:endParaRPr lang="en-RU" dirty="0"/>
+          </a:p>
+        </p:txBody>
+      </p:sp>
+    </p:spTree>
+    <p:extLst>
+      <p:ext uri="{BB962C8B-B14F-4D97-AF65-F5344CB8AC3E}">
+        <p14:creationId xmlns:p14="http://schemas.microsoft.com/office/powerpoint/2010/main" val="129521830"/>
+      </p:ext>
+    </p:extLst>
+  </p:cSld>
+  <p:clrMapOvr>
+    <a:masterClrMapping/>
+  </p:clrMapOvr>
+</p:sld>
+</file>
+
+<file path=ppt/slides/slide18.xml><?xml version="1.0" encoding="utf-8"?>
+<p:sld xmlns:a="http://schemas.openxmlformats.org/drawingml/2006/main" xmlns:r="http://schemas.openxmlformats.org/officeDocument/2006/relationships" xmlns:p="http://schemas.openxmlformats.org/presentationml/2006/main">
+  <p:cSld>
+    <p:spTree>
+      <p:nvGrpSpPr>
+        <p:cNvPr id="1" name=""/>
+        <p:cNvGrpSpPr/>
+        <p:nvPr/>
+      </p:nvGrpSpPr>
+      <p:grpSpPr>
+        <a:xfrm>
+          <a:off x="0" y="0"/>
+          <a:ext cx="0" cy="0"/>
+          <a:chOff x="0" y="0"/>
+          <a:chExt cx="0" cy="0"/>
+        </a:xfrm>
+      </p:grpSpPr>
+      <p:sp>
+        <p:nvSpPr>
+          <p:cNvPr id="2" name="Title 1">
+            <a:extLst>
+              <a:ext uri="{FF2B5EF4-FFF2-40B4-BE49-F238E27FC236}">
+                <a16:creationId xmlns:a16="http://schemas.microsoft.com/office/drawing/2014/main" id="{5527269B-BE3B-9614-D769-971856A8D234}"/>
+              </a:ext>
+            </a:extLst>
+          </p:cNvPr>
+          <p:cNvSpPr>
+            <a:spLocks noGrp="1"/>
+          </p:cNvSpPr>
+          <p:nvPr>
+            <p:ph type="title"/>
+          </p:nvPr>
+        </p:nvSpPr>
+        <p:spPr/>
+        <p:txBody>
+          <a:bodyPr/>
+          <a:lstStyle/>
+          <a:p>
+            <a:r>
+              <a:rPr lang="en-RU" b="1" dirty="0"/>
+              <a:t>Exchanger</a:t>
+            </a:r>
+          </a:p>
+        </p:txBody>
+      </p:sp>
+      <p:pic>
+        <p:nvPicPr>
+          <p:cNvPr id="4" name="Рисунок 5">
+            <a:extLst>
+              <a:ext uri="{FF2B5EF4-FFF2-40B4-BE49-F238E27FC236}">
+                <a16:creationId xmlns:a16="http://schemas.microsoft.com/office/drawing/2014/main" id="{B2240D17-76FA-8837-13B3-11AE9750B5FA}"/>
+              </a:ext>
+            </a:extLst>
+          </p:cNvPr>
+          <p:cNvPicPr>
+            <a:picLocks noGrp="1" noChangeAspect="1"/>
+          </p:cNvPicPr>
+          <p:nvPr>
+            <p:ph idx="1"/>
+          </p:nvPr>
+        </p:nvPicPr>
+        <p:blipFill>
+          <a:blip r:embed="rId2"/>
+          <a:stretch>
+            <a:fillRect/>
+          </a:stretch>
+        </p:blipFill>
+        <p:spPr>
+          <a:xfrm>
+            <a:off x="2490788" y="2339181"/>
+            <a:ext cx="5994400" cy="3594100"/>
+          </a:xfrm>
+          <a:prstGeom prst="rect">
+            <a:avLst/>
+          </a:prstGeom>
+        </p:spPr>
+      </p:pic>
+    </p:spTree>
+    <p:extLst>
+      <p:ext uri="{BB962C8B-B14F-4D97-AF65-F5344CB8AC3E}">
+        <p14:creationId xmlns:p14="http://schemas.microsoft.com/office/powerpoint/2010/main" val="1234672956"/>
+      </p:ext>
+    </p:extLst>
+  </p:cSld>
+  <p:clrMapOvr>
+    <a:masterClrMapping/>
+  </p:clrMapOvr>
+</p:sld>
+</file>
+
+<file path=ppt/slides/slide19.xml><?xml version="1.0" encoding="utf-8"?>
+<p:sld xmlns:a="http://schemas.openxmlformats.org/drawingml/2006/main" xmlns:r="http://schemas.openxmlformats.org/officeDocument/2006/relationships" xmlns:p="http://schemas.openxmlformats.org/presentationml/2006/main">
+  <p:cSld>
+    <p:spTree>
+      <p:nvGrpSpPr>
+        <p:cNvPr id="1" name=""/>
+        <p:cNvGrpSpPr/>
+        <p:nvPr/>
+      </p:nvGrpSpPr>
+      <p:grpSpPr>
+        <a:xfrm>
+          <a:off x="0" y="0"/>
+          <a:ext cx="0" cy="0"/>
+          <a:chOff x="0" y="0"/>
+          <a:chExt cx="0" cy="0"/>
+        </a:xfrm>
+      </p:grpSpPr>
+      <p:sp>
+        <p:nvSpPr>
+          <p:cNvPr id="2" name="Title 1">
+            <a:extLst>
+              <a:ext uri="{FF2B5EF4-FFF2-40B4-BE49-F238E27FC236}">
+                <a16:creationId xmlns:a16="http://schemas.microsoft.com/office/drawing/2014/main" id="{0BB50154-2052-B2EF-7907-EDCD3A3EA90A}"/>
+              </a:ext>
+            </a:extLst>
+          </p:cNvPr>
+          <p:cNvSpPr>
+            <a:spLocks noGrp="1"/>
+          </p:cNvSpPr>
+          <p:nvPr>
+            <p:ph type="title"/>
+          </p:nvPr>
+        </p:nvSpPr>
+        <p:spPr/>
+        <p:txBody>
+          <a:bodyPr/>
+          <a:lstStyle/>
+          <a:p>
+            <a:r>
+              <a:rPr lang="en-RU" b="1" dirty="0"/>
+              <a:t>CyclicBarrier</a:t>
+            </a:r>
+          </a:p>
+        </p:txBody>
+      </p:sp>
+      <p:sp>
+        <p:nvSpPr>
+          <p:cNvPr id="3" name="Content Placeholder 2">
+            <a:extLst>
+              <a:ext uri="{FF2B5EF4-FFF2-40B4-BE49-F238E27FC236}">
+                <a16:creationId xmlns:a16="http://schemas.microsoft.com/office/drawing/2014/main" id="{0F099B49-22A5-11B9-7CE3-4726B9B1DD7B}"/>
+              </a:ext>
+            </a:extLst>
+          </p:cNvPr>
+          <p:cNvSpPr>
+            <a:spLocks noGrp="1"/>
+          </p:cNvSpPr>
+          <p:nvPr>
+            <p:ph idx="1"/>
+          </p:nvPr>
+        </p:nvSpPr>
+        <p:spPr/>
+        <p:txBody>
+          <a:bodyPr/>
+          <a:lstStyle/>
+          <a:p>
+            <a:r>
+              <a:rPr lang="en-RU" i="1" dirty="0"/>
+              <a:t>CyclicBarrier – </a:t>
+            </a:r>
+            <a:r>
+              <a:rPr lang="ru-RU" dirty="0"/>
+              <a:t>синхронизатор, позволяющий </a:t>
+            </a:r>
+            <a:r>
+              <a:rPr lang="ru-RU" dirty="0" err="1"/>
+              <a:t>тредам</a:t>
+            </a:r>
+            <a:r>
+              <a:rPr lang="ru-RU" dirty="0"/>
+              <a:t> ждать друг друга для дальнейшего выполнения общего кода.</a:t>
+            </a:r>
+          </a:p>
+          <a:p>
+            <a:r>
+              <a:rPr lang="en-RU" i="1" dirty="0"/>
+              <a:t>CyclicBarrier</a:t>
+            </a:r>
+            <a:r>
+              <a:rPr lang="en-US" i="1" dirty="0"/>
+              <a:t> </a:t>
+            </a:r>
+            <a:r>
+              <a:rPr lang="ru-RU" dirty="0"/>
+              <a:t>можно </a:t>
+            </a:r>
+            <a:r>
+              <a:rPr lang="ru-RU" dirty="0" err="1"/>
+              <a:t>переиспользовать</a:t>
+            </a:r>
+            <a:r>
+              <a:rPr lang="ru-RU" dirty="0"/>
+              <a:t>.</a:t>
+            </a:r>
+          </a:p>
+          <a:p>
+            <a:endParaRPr lang="ru-RU" dirty="0"/>
+          </a:p>
+          <a:p>
+            <a:endParaRPr lang="en-RU" i="1" dirty="0"/>
+          </a:p>
+        </p:txBody>
+      </p:sp>
+    </p:spTree>
+    <p:extLst>
+      <p:ext uri="{BB962C8B-B14F-4D97-AF65-F5344CB8AC3E}">
+        <p14:creationId xmlns:p14="http://schemas.microsoft.com/office/powerpoint/2010/main" val="3703040602"/>
+      </p:ext>
+    </p:extLst>
+  </p:cSld>
+  <p:clrMapOvr>
+    <a:masterClrMapping/>
+  </p:clrMapOvr>
+</p:sld>
+</file>
+
 <file path=ppt/slides/slide2.xml><?xml version="1.0" encoding="utf-8"?>
 <p:sld xmlns:a="http://schemas.openxmlformats.org/drawingml/2006/main" xmlns:r="http://schemas.openxmlformats.org/officeDocument/2006/relationships" xmlns:p="http://schemas.openxmlformats.org/presentationml/2006/main">
   <p:cSld>
@@ -8496,6 +9341,93 @@
     <p:extLst>
       <p:ext uri="{BB962C8B-B14F-4D97-AF65-F5344CB8AC3E}">
         <p14:creationId xmlns:p14="http://schemas.microsoft.com/office/powerpoint/2010/main" val="3406391692"/>
+      </p:ext>
+    </p:extLst>
+  </p:cSld>
+  <p:clrMapOvr>
+    <a:masterClrMapping/>
+  </p:clrMapOvr>
+</p:sld>
+</file>
+
+<file path=ppt/slides/slide20.xml><?xml version="1.0" encoding="utf-8"?>
+<p:sld xmlns:a="http://schemas.openxmlformats.org/drawingml/2006/main" xmlns:r="http://schemas.openxmlformats.org/officeDocument/2006/relationships" xmlns:p="http://schemas.openxmlformats.org/presentationml/2006/main">
+  <p:cSld>
+    <p:spTree>
+      <p:nvGrpSpPr>
+        <p:cNvPr id="1" name=""/>
+        <p:cNvGrpSpPr/>
+        <p:nvPr/>
+      </p:nvGrpSpPr>
+      <p:grpSpPr>
+        <a:xfrm>
+          <a:off x="0" y="0"/>
+          <a:ext cx="0" cy="0"/>
+          <a:chOff x="0" y="0"/>
+          <a:chExt cx="0" cy="0"/>
+        </a:xfrm>
+      </p:grpSpPr>
+      <p:sp>
+        <p:nvSpPr>
+          <p:cNvPr id="2" name="Title 1">
+            <a:extLst>
+              <a:ext uri="{FF2B5EF4-FFF2-40B4-BE49-F238E27FC236}">
+                <a16:creationId xmlns:a16="http://schemas.microsoft.com/office/drawing/2014/main" id="{A2637588-C661-3A5B-D420-14FFBAF49D45}"/>
+              </a:ext>
+            </a:extLst>
+          </p:cNvPr>
+          <p:cNvSpPr>
+            <a:spLocks noGrp="1"/>
+          </p:cNvSpPr>
+          <p:nvPr>
+            <p:ph type="title"/>
+          </p:nvPr>
+        </p:nvSpPr>
+        <p:spPr/>
+        <p:txBody>
+          <a:bodyPr/>
+          <a:lstStyle/>
+          <a:p>
+            <a:r>
+              <a:rPr lang="en-RU" b="1" dirty="0"/>
+              <a:t>CyclicBarrier</a:t>
+            </a:r>
+          </a:p>
+        </p:txBody>
+      </p:sp>
+      <p:pic>
+        <p:nvPicPr>
+          <p:cNvPr id="6" name="Content Placeholder 5">
+            <a:extLst>
+              <a:ext uri="{FF2B5EF4-FFF2-40B4-BE49-F238E27FC236}">
+                <a16:creationId xmlns:a16="http://schemas.microsoft.com/office/drawing/2014/main" id="{0B8CE9E0-D72C-C69F-E5DB-DDFC013D96D0}"/>
+              </a:ext>
+            </a:extLst>
+          </p:cNvPr>
+          <p:cNvPicPr>
+            <a:picLocks noGrp="1" noChangeAspect="1"/>
+          </p:cNvPicPr>
+          <p:nvPr>
+            <p:ph idx="1"/>
+          </p:nvPr>
+        </p:nvPicPr>
+        <p:blipFill>
+          <a:blip r:embed="rId2"/>
+          <a:stretch>
+            <a:fillRect/>
+          </a:stretch>
+        </p:blipFill>
+        <p:spPr>
+          <a:xfrm>
+            <a:off x="2490788" y="2339181"/>
+            <a:ext cx="5994400" cy="3594100"/>
+          </a:xfrm>
+        </p:spPr>
+      </p:pic>
+    </p:spTree>
+    <p:extLst>
+      <p:ext uri="{BB962C8B-B14F-4D97-AF65-F5344CB8AC3E}">
+        <p14:creationId xmlns:p14="http://schemas.microsoft.com/office/powerpoint/2010/main" val="1932926628"/>
       </p:ext>
     </p:extLst>
   </p:cSld>

</xml_diff>